<commit_message>
Update week 12 progress: lsm
</commit_message>
<xml_diff>
--- a/进度汇报PPT汇总/week12.pptx
+++ b/进度汇报PPT汇总/week12.pptx
@@ -5,17 +5,18 @@
     <p:sldMasterId id="2147483648" r:id="rId1"/>
   </p:sldMasterIdLst>
   <p:notesMasterIdLst>
-    <p:notesMasterId r:id="rId5"/>
+    <p:notesMasterId r:id="rId8"/>
   </p:notesMasterIdLst>
   <p:handoutMasterIdLst>
     <p:handoutMasterId r:id="rId9"/>
   </p:handoutMasterIdLst>
   <p:sldIdLst>
-    <p:sldId id="312" r:id="rId3"/>
-    <p:sldId id="367" r:id="rId4"/>
-    <p:sldId id="368" r:id="rId6"/>
-    <p:sldId id="365" r:id="rId7"/>
-    <p:sldId id="361" r:id="rId8"/>
+    <p:sldId id="312" r:id="rId2"/>
+    <p:sldId id="367" r:id="rId3"/>
+    <p:sldId id="368" r:id="rId4"/>
+    <p:sldId id="369" r:id="rId5"/>
+    <p:sldId id="365" r:id="rId6"/>
+    <p:sldId id="361" r:id="rId7"/>
   </p:sldIdLst>
   <p:sldSz cx="12192000" cy="6858000"/>
   <p:notesSz cx="6858000" cy="9144000"/>
@@ -114,7 +115,72 @@
       </a:defRPr>
     </a:lvl9pPr>
   </p:defaultTextStyle>
+  <p:extLst>
+    <p:ext uri="{EFAFB233-063F-42B5-8137-9DF3F51BA10A}">
+      <p15:sldGuideLst xmlns:p15="http://schemas.microsoft.com/office/powerpoint/2012/main"/>
+    </p:ext>
+  </p:extLst>
 </p:presentation>
+</file>
+
+<file path=ppt/changesInfos/changesInfo1.xml><?xml version="1.0" encoding="utf-8"?>
+<pc:chgInfo xmlns:a="http://schemas.openxmlformats.org/drawingml/2006/main" xmlns:r="http://schemas.openxmlformats.org/officeDocument/2006/relationships" xmlns:ac="http://schemas.microsoft.com/office/drawing/2013/main/command" xmlns:pc="http://schemas.microsoft.com/office/powerpoint/2013/main/command">
+  <pc:docChgLst>
+    <pc:chgData name="snade jack" userId="ba5019ad82b64393" providerId="LiveId" clId="{7CCC0172-CD93-4817-BC0A-AFD655BB4D4D}"/>
+    <pc:docChg chg="custSel addSld modSld">
+      <pc:chgData name="snade jack" userId="ba5019ad82b64393" providerId="LiveId" clId="{7CCC0172-CD93-4817-BC0A-AFD655BB4D4D}" dt="2022-05-13T16:14:27.291" v="400" actId="1076"/>
+      <pc:docMkLst>
+        <pc:docMk/>
+      </pc:docMkLst>
+      <pc:sldChg chg="addSp modSp mod">
+        <pc:chgData name="snade jack" userId="ba5019ad82b64393" providerId="LiveId" clId="{7CCC0172-CD93-4817-BC0A-AFD655BB4D4D}" dt="2022-05-13T16:14:27.291" v="400" actId="1076"/>
+        <pc:sldMkLst>
+          <pc:docMk/>
+          <pc:sldMk cId="0" sldId="365"/>
+        </pc:sldMkLst>
+        <pc:spChg chg="mod">
+          <ac:chgData name="snade jack" userId="ba5019ad82b64393" providerId="LiveId" clId="{7CCC0172-CD93-4817-BC0A-AFD655BB4D4D}" dt="2022-05-13T16:13:57.753" v="392"/>
+          <ac:spMkLst>
+            <pc:docMk/>
+            <pc:sldMk cId="0" sldId="365"/>
+            <ac:spMk id="3" creationId="{00000000-0000-0000-0000-000000000000}"/>
+          </ac:spMkLst>
+        </pc:spChg>
+        <pc:picChg chg="add mod">
+          <ac:chgData name="snade jack" userId="ba5019ad82b64393" providerId="LiveId" clId="{7CCC0172-CD93-4817-BC0A-AFD655BB4D4D}" dt="2022-05-13T16:14:27.291" v="400" actId="1076"/>
+          <ac:picMkLst>
+            <pc:docMk/>
+            <pc:sldMk cId="0" sldId="365"/>
+            <ac:picMk id="6" creationId="{622E07BE-E569-8E65-82BC-FD367D4927D8}"/>
+          </ac:picMkLst>
+        </pc:picChg>
+      </pc:sldChg>
+      <pc:sldChg chg="modSp new mod">
+        <pc:chgData name="snade jack" userId="ba5019ad82b64393" providerId="LiveId" clId="{7CCC0172-CD93-4817-BC0A-AFD655BB4D4D}" dt="2022-05-13T16:13:24.376" v="314"/>
+        <pc:sldMkLst>
+          <pc:docMk/>
+          <pc:sldMk cId="1098683772" sldId="369"/>
+        </pc:sldMkLst>
+        <pc:spChg chg="mod">
+          <ac:chgData name="snade jack" userId="ba5019ad82b64393" providerId="LiveId" clId="{7CCC0172-CD93-4817-BC0A-AFD655BB4D4D}" dt="2022-05-13T16:10:37.942" v="1"/>
+          <ac:spMkLst>
+            <pc:docMk/>
+            <pc:sldMk cId="1098683772" sldId="369"/>
+            <ac:spMk id="2" creationId="{6DF13375-A72F-861E-BF2F-5F4DFAF80F46}"/>
+          </ac:spMkLst>
+        </pc:spChg>
+        <pc:spChg chg="mod">
+          <ac:chgData name="snade jack" userId="ba5019ad82b64393" providerId="LiveId" clId="{7CCC0172-CD93-4817-BC0A-AFD655BB4D4D}" dt="2022-05-13T16:13:24.376" v="314"/>
+          <ac:spMkLst>
+            <pc:docMk/>
+            <pc:sldMk cId="1098683772" sldId="369"/>
+            <ac:spMk id="3" creationId="{3832D4E5-4163-5A6E-7EE4-819BCFF88254}"/>
+          </ac:spMkLst>
+        </pc:spChg>
+      </pc:sldChg>
+    </pc:docChg>
+  </pc:docChgLst>
+</pc:chgInfo>
 </file>
 
 <file path=ppt/handoutMasters/handoutMaster1.xml><?xml version="1.0" encoding="utf-8"?>
@@ -199,6 +265,7 @@
           <a:p>
             <a:fld id="{0F9B84EA-7D68-4D60-9CB1-D50884785D1C}" type="datetimeFigureOut">
               <a:rPr lang="zh-CN" altLang="en-US" smtClean="0"/>
+              <a:t>2022/5/14</a:t>
             </a:fld>
             <a:endParaRPr lang="zh-CN" altLang="en-US"/>
           </a:p>
@@ -264,12 +331,18 @@
           <a:p>
             <a:fld id="{8D4E0FC9-F1F8-4FAE-9988-3BA365CFD46F}" type="slidenum">
               <a:rPr lang="zh-CN" altLang="en-US" smtClean="0"/>
+              <a:t>‹#›</a:t>
             </a:fld>
             <a:endParaRPr lang="zh-CN" altLang="en-US"/>
           </a:p>
         </p:txBody>
       </p:sp>
     </p:spTree>
+    <p:extLst>
+      <p:ext uri="{BB962C8B-B14F-4D97-AF65-F5344CB8AC3E}">
+        <p14:creationId xmlns:p14="http://schemas.microsoft.com/office/powerpoint/2010/main" val="1"/>
+      </p:ext>
+    </p:extLst>
   </p:cSld>
   <p:clrMap bg1="lt1" tx1="dk1" bg2="lt2" tx2="dk2" accent1="accent1" accent2="accent2" accent3="accent3" accent4="accent4" accent5="accent5" accent6="accent6" hlink="hlink" folHlink="folHlink"/>
 </p:handoutMaster>
@@ -357,6 +430,7 @@
           <a:p>
             <a:fld id="{7B4F2CEB-5DF7-4808-8224-1EF646B93121}" type="datetimeFigureOut">
               <a:rPr lang="zh-CN" altLang="en-US" smtClean="0"/>
+              <a:t>2022/5/14</a:t>
             </a:fld>
             <a:endParaRPr lang="zh-CN" altLang="en-US"/>
           </a:p>
@@ -423,7 +497,6 @@
               <a:rPr lang="zh-CN" altLang="en-US"/>
               <a:t>单击此处编辑母版文本样式</a:t>
             </a:r>
-            <a:endParaRPr lang="zh-CN" altLang="en-US"/>
           </a:p>
           <a:p>
             <a:pPr lvl="1"/>
@@ -431,7 +504,6 @@
               <a:rPr lang="zh-CN" altLang="en-US"/>
               <a:t>二级</a:t>
             </a:r>
-            <a:endParaRPr lang="zh-CN" altLang="en-US"/>
           </a:p>
           <a:p>
             <a:pPr lvl="2"/>
@@ -439,7 +511,6 @@
               <a:rPr lang="zh-CN" altLang="en-US"/>
               <a:t>三级</a:t>
             </a:r>
-            <a:endParaRPr lang="zh-CN" altLang="en-US"/>
           </a:p>
           <a:p>
             <a:pPr lvl="3"/>
@@ -447,7 +518,6 @@
               <a:rPr lang="zh-CN" altLang="en-US"/>
               <a:t>四级</a:t>
             </a:r>
-            <a:endParaRPr lang="zh-CN" altLang="en-US"/>
           </a:p>
           <a:p>
             <a:pPr lvl="4"/>
@@ -455,7 +525,6 @@
               <a:rPr lang="zh-CN" altLang="en-US"/>
               <a:t>五级</a:t>
             </a:r>
-            <a:endParaRPr lang="zh-CN" altLang="en-US"/>
           </a:p>
         </p:txBody>
       </p:sp>
@@ -519,6 +588,7 @@
           <a:p>
             <a:fld id="{83AA1F61-0992-4120-A1E9-FA3A21BB776E}" type="slidenum">
               <a:rPr lang="zh-CN" altLang="en-US" smtClean="0"/>
+              <a:t>‹#›</a:t>
             </a:fld>
             <a:endParaRPr lang="zh-CN" altLang="en-US"/>
           </a:p>
@@ -631,11 +701,20 @@
         <p:cNvGrpSpPr/>
         <p:nvPr/>
       </p:nvGrpSpPr>
-      <p:grpSpPr/>
+      <p:grpSpPr>
+        <a:xfrm>
+          <a:off x="0" y="0"/>
+          <a:ext cx="0" cy="0"/>
+          <a:chOff x="0" y="0"/>
+          <a:chExt cx="0" cy="0"/>
+        </a:xfrm>
+      </p:grpSpPr>
       <p:sp>
         <p:nvSpPr>
           <p:cNvPr id="2" name="幻灯片图像占位符 1"/>
-          <p:cNvSpPr/>
+          <p:cNvSpPr>
+            <a:spLocks noGrp="1" noRot="1" noChangeAspect="1"/>
+          </p:cNvSpPr>
           <p:nvPr>
             <p:ph type="sldImg" idx="2"/>
           </p:nvPr>
@@ -645,7 +724,9 @@
       <p:sp>
         <p:nvSpPr>
           <p:cNvPr id="3" name="文本占位符 2"/>
-          <p:cNvSpPr/>
+          <p:cNvSpPr>
+            <a:spLocks noGrp="1"/>
+          </p:cNvSpPr>
           <p:nvPr>
             <p:ph type="body" idx="3"/>
           </p:nvPr>
@@ -653,6 +734,7 @@
         <p:spPr/>
         <p:txBody>
           <a:bodyPr/>
+          <a:lstStyle/>
           <a:p>
             <a:endParaRPr lang="zh-CN" altLang="en-US"/>
           </a:p>
@@ -711,7 +793,6 @@
               <a:rPr lang="zh-CN" altLang="en-US" dirty="0"/>
               <a:t>单击此处编辑母版标题样式</a:t>
             </a:r>
-            <a:endParaRPr lang="zh-CN" altLang="en-US" dirty="0"/>
           </a:p>
         </p:txBody>
       </p:sp>
@@ -776,7 +857,6 @@
               <a:rPr lang="zh-CN" altLang="en-US"/>
               <a:t>单击此处编辑母版副标题样式</a:t>
             </a:r>
-            <a:endParaRPr lang="zh-CN" altLang="en-US"/>
           </a:p>
         </p:txBody>
       </p:sp>
@@ -797,6 +877,7 @@
           <a:p>
             <a:fld id="{A9482DDB-C4B4-4602-831B-33D7CA22852C}" type="datetime1">
               <a:rPr lang="zh-CN" altLang="en-US" smtClean="0"/>
+              <a:t>2022/5/14</a:t>
             </a:fld>
             <a:endParaRPr lang="zh-CN" altLang="en-US"/>
           </a:p>
@@ -845,6 +926,7 @@
           <a:p>
             <a:fld id="{519AEA81-C1FD-4B2C-87D1-3FA637539CC6}" type="slidenum">
               <a:rPr lang="zh-CN" altLang="en-US" smtClean="0"/>
+              <a:t>‹#›</a:t>
             </a:fld>
             <a:endParaRPr lang="zh-CN" altLang="en-US" dirty="0"/>
           </a:p>
@@ -894,7 +976,6 @@
               <a:rPr lang="zh-CN" altLang="en-US"/>
               <a:t>单击此处编辑母版标题样式</a:t>
             </a:r>
-            <a:endParaRPr lang="zh-CN" altLang="en-US"/>
           </a:p>
         </p:txBody>
       </p:sp>
@@ -918,7 +999,6 @@
               <a:rPr lang="zh-CN" altLang="en-US"/>
               <a:t>单击此处编辑母版文本样式</a:t>
             </a:r>
-            <a:endParaRPr lang="zh-CN" altLang="en-US"/>
           </a:p>
           <a:p>
             <a:pPr lvl="1"/>
@@ -926,7 +1006,6 @@
               <a:rPr lang="zh-CN" altLang="en-US"/>
               <a:t>二级</a:t>
             </a:r>
-            <a:endParaRPr lang="zh-CN" altLang="en-US"/>
           </a:p>
           <a:p>
             <a:pPr lvl="2"/>
@@ -934,7 +1013,6 @@
               <a:rPr lang="zh-CN" altLang="en-US"/>
               <a:t>三级</a:t>
             </a:r>
-            <a:endParaRPr lang="zh-CN" altLang="en-US"/>
           </a:p>
           <a:p>
             <a:pPr lvl="3"/>
@@ -942,7 +1020,6 @@
               <a:rPr lang="zh-CN" altLang="en-US"/>
               <a:t>四级</a:t>
             </a:r>
-            <a:endParaRPr lang="zh-CN" altLang="en-US"/>
           </a:p>
           <a:p>
             <a:pPr lvl="4"/>
@@ -950,7 +1027,6 @@
               <a:rPr lang="zh-CN" altLang="en-US"/>
               <a:t>五级</a:t>
             </a:r>
-            <a:endParaRPr lang="zh-CN" altLang="en-US"/>
           </a:p>
         </p:txBody>
       </p:sp>
@@ -971,6 +1047,7 @@
           <a:p>
             <a:fld id="{E9B53CE2-FC60-405A-858E-53FC0D5D5173}" type="datetime1">
               <a:rPr lang="zh-CN" altLang="en-US" smtClean="0"/>
+              <a:t>2022/5/14</a:t>
             </a:fld>
             <a:endParaRPr lang="zh-CN" altLang="en-US"/>
           </a:p>
@@ -1012,6 +1089,7 @@
           <a:p>
             <a:fld id="{519AEA81-C1FD-4B2C-87D1-3FA637539CC6}" type="slidenum">
               <a:rPr lang="zh-CN" altLang="en-US" smtClean="0"/>
+              <a:t>‹#›</a:t>
             </a:fld>
             <a:endParaRPr lang="zh-CN" altLang="en-US"/>
           </a:p>
@@ -1066,7 +1144,6 @@
               <a:rPr lang="zh-CN" altLang="en-US"/>
               <a:t>单击此处编辑母版标题样式</a:t>
             </a:r>
-            <a:endParaRPr lang="zh-CN" altLang="en-US"/>
           </a:p>
         </p:txBody>
       </p:sp>
@@ -1095,7 +1172,6 @@
               <a:rPr lang="zh-CN" altLang="en-US"/>
               <a:t>单击此处编辑母版文本样式</a:t>
             </a:r>
-            <a:endParaRPr lang="zh-CN" altLang="en-US"/>
           </a:p>
           <a:p>
             <a:pPr lvl="1"/>
@@ -1103,7 +1179,6 @@
               <a:rPr lang="zh-CN" altLang="en-US"/>
               <a:t>二级</a:t>
             </a:r>
-            <a:endParaRPr lang="zh-CN" altLang="en-US"/>
           </a:p>
           <a:p>
             <a:pPr lvl="2"/>
@@ -1111,7 +1186,6 @@
               <a:rPr lang="zh-CN" altLang="en-US"/>
               <a:t>三级</a:t>
             </a:r>
-            <a:endParaRPr lang="zh-CN" altLang="en-US"/>
           </a:p>
           <a:p>
             <a:pPr lvl="3"/>
@@ -1119,7 +1193,6 @@
               <a:rPr lang="zh-CN" altLang="en-US"/>
               <a:t>四级</a:t>
             </a:r>
-            <a:endParaRPr lang="zh-CN" altLang="en-US"/>
           </a:p>
           <a:p>
             <a:pPr lvl="4"/>
@@ -1127,7 +1200,6 @@
               <a:rPr lang="zh-CN" altLang="en-US"/>
               <a:t>五级</a:t>
             </a:r>
-            <a:endParaRPr lang="zh-CN" altLang="en-US"/>
           </a:p>
         </p:txBody>
       </p:sp>
@@ -1148,6 +1220,7 @@
           <a:p>
             <a:fld id="{2C0097D1-6629-49F3-8447-AFCF4DA4A258}" type="datetime1">
               <a:rPr lang="zh-CN" altLang="en-US" smtClean="0"/>
+              <a:t>2022/5/14</a:t>
             </a:fld>
             <a:endParaRPr lang="zh-CN" altLang="en-US"/>
           </a:p>
@@ -1189,6 +1262,7 @@
           <a:p>
             <a:fld id="{519AEA81-C1FD-4B2C-87D1-3FA637539CC6}" type="slidenum">
               <a:rPr lang="zh-CN" altLang="en-US" smtClean="0"/>
+              <a:t>‹#›</a:t>
             </a:fld>
             <a:endParaRPr lang="zh-CN" altLang="en-US"/>
           </a:p>
@@ -1238,7 +1312,6 @@
               <a:rPr lang="zh-CN" altLang="en-US"/>
               <a:t>单击此处编辑母版标题样式</a:t>
             </a:r>
-            <a:endParaRPr lang="zh-CN" altLang="en-US"/>
           </a:p>
         </p:txBody>
       </p:sp>
@@ -1262,7 +1335,6 @@
               <a:rPr lang="zh-CN" altLang="en-US"/>
               <a:t>单击此处编辑母版文本样式</a:t>
             </a:r>
-            <a:endParaRPr lang="zh-CN" altLang="en-US"/>
           </a:p>
           <a:p>
             <a:pPr lvl="1"/>
@@ -1270,7 +1342,6 @@
               <a:rPr lang="zh-CN" altLang="en-US"/>
               <a:t>二级</a:t>
             </a:r>
-            <a:endParaRPr lang="zh-CN" altLang="en-US"/>
           </a:p>
           <a:p>
             <a:pPr lvl="2"/>
@@ -1278,7 +1349,6 @@
               <a:rPr lang="zh-CN" altLang="en-US"/>
               <a:t>三级</a:t>
             </a:r>
-            <a:endParaRPr lang="zh-CN" altLang="en-US"/>
           </a:p>
           <a:p>
             <a:pPr lvl="3"/>
@@ -1286,7 +1356,6 @@
               <a:rPr lang="zh-CN" altLang="en-US"/>
               <a:t>四级</a:t>
             </a:r>
-            <a:endParaRPr lang="zh-CN" altLang="en-US"/>
           </a:p>
           <a:p>
             <a:pPr lvl="4"/>
@@ -1294,7 +1363,6 @@
               <a:rPr lang="zh-CN" altLang="en-US"/>
               <a:t>五级</a:t>
             </a:r>
-            <a:endParaRPr lang="zh-CN" altLang="en-US"/>
           </a:p>
         </p:txBody>
       </p:sp>
@@ -1315,6 +1383,7 @@
           <a:p>
             <a:fld id="{91C93C8A-D80A-4DE1-A999-215FD607DBE3}" type="datetime1">
               <a:rPr lang="zh-CN" altLang="en-US" smtClean="0"/>
+              <a:t>2022/5/14</a:t>
             </a:fld>
             <a:endParaRPr lang="zh-CN" altLang="en-US"/>
           </a:p>
@@ -1356,6 +1425,7 @@
           <a:p>
             <a:fld id="{519AEA81-C1FD-4B2C-87D1-3FA637539CC6}" type="slidenum">
               <a:rPr lang="zh-CN" altLang="en-US" smtClean="0"/>
+              <a:t>‹#›</a:t>
             </a:fld>
             <a:endParaRPr lang="zh-CN" altLang="en-US" dirty="0"/>
           </a:p>
@@ -1417,7 +1487,6 @@
               <a:rPr lang="zh-CN" altLang="en-US" dirty="0"/>
               <a:t>单击此处编辑母版标题样式</a:t>
             </a:r>
-            <a:endParaRPr lang="zh-CN" altLang="en-US" dirty="0"/>
           </a:p>
         </p:txBody>
       </p:sp>
@@ -1537,7 +1606,6 @@
               <a:rPr lang="zh-CN" altLang="en-US" dirty="0"/>
               <a:t>单击此处编辑母版文本样式</a:t>
             </a:r>
-            <a:endParaRPr lang="zh-CN" altLang="en-US" dirty="0"/>
           </a:p>
         </p:txBody>
       </p:sp>
@@ -1558,6 +1626,7 @@
           <a:p>
             <a:fld id="{1B426F48-097D-4E21-B763-D29753566D82}" type="datetime1">
               <a:rPr lang="zh-CN" altLang="en-US" smtClean="0"/>
+              <a:t>2022/5/14</a:t>
             </a:fld>
             <a:endParaRPr lang="zh-CN" altLang="en-US"/>
           </a:p>
@@ -1599,6 +1668,7 @@
           <a:p>
             <a:fld id="{519AEA81-C1FD-4B2C-87D1-3FA637539CC6}" type="slidenum">
               <a:rPr lang="zh-CN" altLang="en-US" smtClean="0"/>
+              <a:t>‹#›</a:t>
             </a:fld>
             <a:endParaRPr lang="zh-CN" altLang="en-US"/>
           </a:p>
@@ -1648,7 +1718,6 @@
               <a:rPr lang="zh-CN" altLang="en-US"/>
               <a:t>单击此处编辑母版标题样式</a:t>
             </a:r>
-            <a:endParaRPr lang="zh-CN" altLang="en-US"/>
           </a:p>
         </p:txBody>
       </p:sp>
@@ -1677,7 +1746,6 @@
               <a:rPr lang="zh-CN" altLang="en-US"/>
               <a:t>单击此处编辑母版文本样式</a:t>
             </a:r>
-            <a:endParaRPr lang="zh-CN" altLang="en-US"/>
           </a:p>
           <a:p>
             <a:pPr lvl="1"/>
@@ -1685,7 +1753,6 @@
               <a:rPr lang="zh-CN" altLang="en-US"/>
               <a:t>二级</a:t>
             </a:r>
-            <a:endParaRPr lang="zh-CN" altLang="en-US"/>
           </a:p>
           <a:p>
             <a:pPr lvl="2"/>
@@ -1693,7 +1760,6 @@
               <a:rPr lang="zh-CN" altLang="en-US"/>
               <a:t>三级</a:t>
             </a:r>
-            <a:endParaRPr lang="zh-CN" altLang="en-US"/>
           </a:p>
           <a:p>
             <a:pPr lvl="3"/>
@@ -1701,7 +1767,6 @@
               <a:rPr lang="zh-CN" altLang="en-US"/>
               <a:t>四级</a:t>
             </a:r>
-            <a:endParaRPr lang="zh-CN" altLang="en-US"/>
           </a:p>
           <a:p>
             <a:pPr lvl="4"/>
@@ -1709,7 +1774,6 @@
               <a:rPr lang="zh-CN" altLang="en-US"/>
               <a:t>五级</a:t>
             </a:r>
-            <a:endParaRPr lang="zh-CN" altLang="en-US"/>
           </a:p>
         </p:txBody>
       </p:sp>
@@ -1738,7 +1802,6 @@
               <a:rPr lang="zh-CN" altLang="en-US"/>
               <a:t>单击此处编辑母版文本样式</a:t>
             </a:r>
-            <a:endParaRPr lang="zh-CN" altLang="en-US"/>
           </a:p>
           <a:p>
             <a:pPr lvl="1"/>
@@ -1746,7 +1809,6 @@
               <a:rPr lang="zh-CN" altLang="en-US"/>
               <a:t>二级</a:t>
             </a:r>
-            <a:endParaRPr lang="zh-CN" altLang="en-US"/>
           </a:p>
           <a:p>
             <a:pPr lvl="2"/>
@@ -1754,7 +1816,6 @@
               <a:rPr lang="zh-CN" altLang="en-US"/>
               <a:t>三级</a:t>
             </a:r>
-            <a:endParaRPr lang="zh-CN" altLang="en-US"/>
           </a:p>
           <a:p>
             <a:pPr lvl="3"/>
@@ -1762,7 +1823,6 @@
               <a:rPr lang="zh-CN" altLang="en-US"/>
               <a:t>四级</a:t>
             </a:r>
-            <a:endParaRPr lang="zh-CN" altLang="en-US"/>
           </a:p>
           <a:p>
             <a:pPr lvl="4"/>
@@ -1770,7 +1830,6 @@
               <a:rPr lang="zh-CN" altLang="en-US"/>
               <a:t>五级</a:t>
             </a:r>
-            <a:endParaRPr lang="zh-CN" altLang="en-US"/>
           </a:p>
         </p:txBody>
       </p:sp>
@@ -1791,6 +1850,7 @@
           <a:p>
             <a:fld id="{493A7B37-EF3E-4286-9A7A-8A71F864A976}" type="datetime1">
               <a:rPr lang="zh-CN" altLang="en-US" smtClean="0"/>
+              <a:t>2022/5/14</a:t>
             </a:fld>
             <a:endParaRPr lang="zh-CN" altLang="en-US"/>
           </a:p>
@@ -1832,6 +1892,7 @@
           <a:p>
             <a:fld id="{519AEA81-C1FD-4B2C-87D1-3FA637539CC6}" type="slidenum">
               <a:rPr lang="zh-CN" altLang="en-US" smtClean="0"/>
+              <a:t>‹#›</a:t>
             </a:fld>
             <a:endParaRPr lang="zh-CN" altLang="en-US"/>
           </a:p>
@@ -1886,7 +1947,6 @@
               <a:rPr lang="zh-CN" altLang="en-US"/>
               <a:t>单击此处编辑母版标题样式</a:t>
             </a:r>
-            <a:endParaRPr lang="zh-CN" altLang="en-US"/>
           </a:p>
         </p:txBody>
       </p:sp>
@@ -1952,7 +2012,6 @@
               <a:rPr lang="zh-CN" altLang="en-US"/>
               <a:t>单击此处编辑母版文本样式</a:t>
             </a:r>
-            <a:endParaRPr lang="zh-CN" altLang="en-US"/>
           </a:p>
         </p:txBody>
       </p:sp>
@@ -1981,7 +2040,6 @@
               <a:rPr lang="zh-CN" altLang="en-US"/>
               <a:t>单击此处编辑母版文本样式</a:t>
             </a:r>
-            <a:endParaRPr lang="zh-CN" altLang="en-US"/>
           </a:p>
           <a:p>
             <a:pPr lvl="1"/>
@@ -1989,7 +2047,6 @@
               <a:rPr lang="zh-CN" altLang="en-US"/>
               <a:t>二级</a:t>
             </a:r>
-            <a:endParaRPr lang="zh-CN" altLang="en-US"/>
           </a:p>
           <a:p>
             <a:pPr lvl="2"/>
@@ -1997,7 +2054,6 @@
               <a:rPr lang="zh-CN" altLang="en-US"/>
               <a:t>三级</a:t>
             </a:r>
-            <a:endParaRPr lang="zh-CN" altLang="en-US"/>
           </a:p>
           <a:p>
             <a:pPr lvl="3"/>
@@ -2005,7 +2061,6 @@
               <a:rPr lang="zh-CN" altLang="en-US"/>
               <a:t>四级</a:t>
             </a:r>
-            <a:endParaRPr lang="zh-CN" altLang="en-US"/>
           </a:p>
           <a:p>
             <a:pPr lvl="4"/>
@@ -2013,7 +2068,6 @@
               <a:rPr lang="zh-CN" altLang="en-US"/>
               <a:t>五级</a:t>
             </a:r>
-            <a:endParaRPr lang="zh-CN" altLang="en-US"/>
           </a:p>
         </p:txBody>
       </p:sp>
@@ -2079,7 +2133,6 @@
               <a:rPr lang="zh-CN" altLang="en-US"/>
               <a:t>单击此处编辑母版文本样式</a:t>
             </a:r>
-            <a:endParaRPr lang="zh-CN" altLang="en-US"/>
           </a:p>
         </p:txBody>
       </p:sp>
@@ -2108,7 +2161,6 @@
               <a:rPr lang="zh-CN" altLang="en-US"/>
               <a:t>单击此处编辑母版文本样式</a:t>
             </a:r>
-            <a:endParaRPr lang="zh-CN" altLang="en-US"/>
           </a:p>
           <a:p>
             <a:pPr lvl="1"/>
@@ -2116,7 +2168,6 @@
               <a:rPr lang="zh-CN" altLang="en-US"/>
               <a:t>二级</a:t>
             </a:r>
-            <a:endParaRPr lang="zh-CN" altLang="en-US"/>
           </a:p>
           <a:p>
             <a:pPr lvl="2"/>
@@ -2124,7 +2175,6 @@
               <a:rPr lang="zh-CN" altLang="en-US"/>
               <a:t>三级</a:t>
             </a:r>
-            <a:endParaRPr lang="zh-CN" altLang="en-US"/>
           </a:p>
           <a:p>
             <a:pPr lvl="3"/>
@@ -2132,7 +2182,6 @@
               <a:rPr lang="zh-CN" altLang="en-US"/>
               <a:t>四级</a:t>
             </a:r>
-            <a:endParaRPr lang="zh-CN" altLang="en-US"/>
           </a:p>
           <a:p>
             <a:pPr lvl="4"/>
@@ -2140,7 +2189,6 @@
               <a:rPr lang="zh-CN" altLang="en-US"/>
               <a:t>五级</a:t>
             </a:r>
-            <a:endParaRPr lang="zh-CN" altLang="en-US"/>
           </a:p>
         </p:txBody>
       </p:sp>
@@ -2161,6 +2209,7 @@
           <a:p>
             <a:fld id="{EE865B14-2060-46DE-8771-7F348C538412}" type="datetime1">
               <a:rPr lang="zh-CN" altLang="en-US" smtClean="0"/>
+              <a:t>2022/5/14</a:t>
             </a:fld>
             <a:endParaRPr lang="zh-CN" altLang="en-US"/>
           </a:p>
@@ -2202,6 +2251,7 @@
           <a:p>
             <a:fld id="{519AEA81-C1FD-4B2C-87D1-3FA637539CC6}" type="slidenum">
               <a:rPr lang="zh-CN" altLang="en-US" smtClean="0"/>
+              <a:t>‹#›</a:t>
             </a:fld>
             <a:endParaRPr lang="zh-CN" altLang="en-US"/>
           </a:p>
@@ -2251,7 +2301,6 @@
               <a:rPr lang="zh-CN" altLang="en-US"/>
               <a:t>单击此处编辑母版标题样式</a:t>
             </a:r>
-            <a:endParaRPr lang="zh-CN" altLang="en-US"/>
           </a:p>
         </p:txBody>
       </p:sp>
@@ -2272,6 +2321,7 @@
           <a:p>
             <a:fld id="{85AF00BA-1A83-449D-8AEA-1E736981FE20}" type="datetime1">
               <a:rPr lang="zh-CN" altLang="en-US" smtClean="0"/>
+              <a:t>2022/5/14</a:t>
             </a:fld>
             <a:endParaRPr lang="zh-CN" altLang="en-US"/>
           </a:p>
@@ -2313,6 +2363,7 @@
           <a:p>
             <a:fld id="{519AEA81-C1FD-4B2C-87D1-3FA637539CC6}" type="slidenum">
               <a:rPr lang="zh-CN" altLang="en-US" smtClean="0"/>
+              <a:t>‹#›</a:t>
             </a:fld>
             <a:endParaRPr lang="zh-CN" altLang="en-US"/>
           </a:p>
@@ -2360,6 +2411,7 @@
           <a:p>
             <a:fld id="{65F816BB-10C1-4E24-9BB7-3D382288F272}" type="datetime1">
               <a:rPr lang="zh-CN" altLang="en-US" smtClean="0"/>
+              <a:t>2022/5/14</a:t>
             </a:fld>
             <a:endParaRPr lang="zh-CN" altLang="en-US"/>
           </a:p>
@@ -2401,6 +2453,7 @@
           <a:p>
             <a:fld id="{519AEA81-C1FD-4B2C-87D1-3FA637539CC6}" type="slidenum">
               <a:rPr lang="zh-CN" altLang="en-US" smtClean="0"/>
+              <a:t>‹#›</a:t>
             </a:fld>
             <a:endParaRPr lang="zh-CN" altLang="en-US"/>
           </a:p>
@@ -2459,7 +2512,6 @@
               <a:rPr lang="zh-CN" altLang="en-US"/>
               <a:t>单击此处编辑母版标题样式</a:t>
             </a:r>
-            <a:endParaRPr lang="zh-CN" altLang="en-US"/>
           </a:p>
         </p:txBody>
       </p:sp>
@@ -2516,7 +2568,6 @@
               <a:rPr lang="zh-CN" altLang="en-US"/>
               <a:t>单击此处编辑母版文本样式</a:t>
             </a:r>
-            <a:endParaRPr lang="zh-CN" altLang="en-US"/>
           </a:p>
           <a:p>
             <a:pPr lvl="1"/>
@@ -2524,7 +2575,6 @@
               <a:rPr lang="zh-CN" altLang="en-US"/>
               <a:t>二级</a:t>
             </a:r>
-            <a:endParaRPr lang="zh-CN" altLang="en-US"/>
           </a:p>
           <a:p>
             <a:pPr lvl="2"/>
@@ -2532,7 +2582,6 @@
               <a:rPr lang="zh-CN" altLang="en-US"/>
               <a:t>三级</a:t>
             </a:r>
-            <a:endParaRPr lang="zh-CN" altLang="en-US"/>
           </a:p>
           <a:p>
             <a:pPr lvl="3"/>
@@ -2540,7 +2589,6 @@
               <a:rPr lang="zh-CN" altLang="en-US"/>
               <a:t>四级</a:t>
             </a:r>
-            <a:endParaRPr lang="zh-CN" altLang="en-US"/>
           </a:p>
           <a:p>
             <a:pPr lvl="4"/>
@@ -2548,7 +2596,6 @@
               <a:rPr lang="zh-CN" altLang="en-US"/>
               <a:t>五级</a:t>
             </a:r>
-            <a:endParaRPr lang="zh-CN" altLang="en-US"/>
           </a:p>
         </p:txBody>
       </p:sp>
@@ -2614,7 +2661,6 @@
               <a:rPr lang="zh-CN" altLang="en-US"/>
               <a:t>单击此处编辑母版文本样式</a:t>
             </a:r>
-            <a:endParaRPr lang="zh-CN" altLang="en-US"/>
           </a:p>
         </p:txBody>
       </p:sp>
@@ -2635,6 +2681,7 @@
           <a:p>
             <a:fld id="{EDB3BA1B-C557-45E4-9C66-0434B6B2BC7D}" type="datetime1">
               <a:rPr lang="zh-CN" altLang="en-US" smtClean="0"/>
+              <a:t>2022/5/14</a:t>
             </a:fld>
             <a:endParaRPr lang="zh-CN" altLang="en-US"/>
           </a:p>
@@ -2676,6 +2723,7 @@
           <a:p>
             <a:fld id="{519AEA81-C1FD-4B2C-87D1-3FA637539CC6}" type="slidenum">
               <a:rPr lang="zh-CN" altLang="en-US" smtClean="0"/>
+              <a:t>‹#›</a:t>
             </a:fld>
             <a:endParaRPr lang="zh-CN" altLang="en-US"/>
           </a:p>
@@ -2734,7 +2782,6 @@
               <a:rPr lang="zh-CN" altLang="en-US"/>
               <a:t>单击此处编辑母版标题样式</a:t>
             </a:r>
-            <a:endParaRPr lang="zh-CN" altLang="en-US"/>
           </a:p>
         </p:txBody>
       </p:sp>
@@ -2861,7 +2908,6 @@
               <a:rPr lang="zh-CN" altLang="en-US"/>
               <a:t>单击此处编辑母版文本样式</a:t>
             </a:r>
-            <a:endParaRPr lang="zh-CN" altLang="en-US"/>
           </a:p>
         </p:txBody>
       </p:sp>
@@ -2882,6 +2928,7 @@
           <a:p>
             <a:fld id="{1940BD16-E0DE-4D56-BE59-0FECC58F0719}" type="datetime1">
               <a:rPr lang="zh-CN" altLang="en-US" smtClean="0"/>
+              <a:t>2022/5/14</a:t>
             </a:fld>
             <a:endParaRPr lang="zh-CN" altLang="en-US"/>
           </a:p>
@@ -2923,6 +2970,7 @@
           <a:p>
             <a:fld id="{519AEA81-C1FD-4B2C-87D1-3FA637539CC6}" type="slidenum">
               <a:rPr lang="zh-CN" altLang="en-US" smtClean="0"/>
+              <a:t>‹#›</a:t>
             </a:fld>
             <a:endParaRPr lang="zh-CN" altLang="en-US"/>
           </a:p>
@@ -2987,7 +3035,6 @@
               <a:rPr lang="zh-CN" altLang="en-US" dirty="0"/>
               <a:t>单击此处编辑母版标题样式</a:t>
             </a:r>
-            <a:endParaRPr lang="zh-CN" altLang="en-US" dirty="0"/>
           </a:p>
         </p:txBody>
       </p:sp>
@@ -3021,7 +3068,6 @@
               <a:rPr lang="zh-CN" altLang="en-US" dirty="0"/>
               <a:t>单击此处编辑母版文本样式</a:t>
             </a:r>
-            <a:endParaRPr lang="zh-CN" altLang="en-US" dirty="0"/>
           </a:p>
           <a:p>
             <a:pPr lvl="1"/>
@@ -3029,7 +3075,6 @@
               <a:rPr lang="zh-CN" altLang="en-US" dirty="0"/>
               <a:t>二级</a:t>
             </a:r>
-            <a:endParaRPr lang="zh-CN" altLang="en-US" dirty="0"/>
           </a:p>
           <a:p>
             <a:pPr lvl="2"/>
@@ -3037,7 +3082,6 @@
               <a:rPr lang="zh-CN" altLang="en-US" dirty="0"/>
               <a:t>三级</a:t>
             </a:r>
-            <a:endParaRPr lang="zh-CN" altLang="en-US" dirty="0"/>
           </a:p>
           <a:p>
             <a:pPr lvl="3"/>
@@ -3045,7 +3089,6 @@
               <a:rPr lang="zh-CN" altLang="en-US" dirty="0"/>
               <a:t>四级</a:t>
             </a:r>
-            <a:endParaRPr lang="zh-CN" altLang="en-US" dirty="0"/>
           </a:p>
           <a:p>
             <a:pPr lvl="4"/>
@@ -3053,7 +3096,6 @@
               <a:rPr lang="zh-CN" altLang="en-US" dirty="0"/>
               <a:t>五级</a:t>
             </a:r>
-            <a:endParaRPr lang="zh-CN" altLang="en-US" dirty="0"/>
           </a:p>
         </p:txBody>
       </p:sp>
@@ -3092,6 +3134,7 @@
           <a:p>
             <a:fld id="{A1C7E667-A427-4A7F-A6E1-89474718F88F}" type="datetime1">
               <a:rPr lang="zh-CN" altLang="en-US" smtClean="0"/>
+              <a:t>2022/5/14</a:t>
             </a:fld>
             <a:endParaRPr lang="zh-CN" altLang="en-US"/>
           </a:p>
@@ -3169,6 +3212,7 @@
           <a:p>
             <a:fld id="{519AEA81-C1FD-4B2C-87D1-3FA637539CC6}" type="slidenum">
               <a:rPr lang="zh-CN" altLang="en-US" smtClean="0"/>
+              <a:t>‹#›</a:t>
             </a:fld>
             <a:endParaRPr lang="zh-CN" altLang="en-US"/>
           </a:p>
@@ -3564,7 +3608,6 @@
               <a:rPr lang="zh-CN" altLang="en-US" dirty="0"/>
               <a:t>进度汇报</a:t>
             </a:r>
-            <a:endParaRPr lang="zh-CN" altLang="en-US" dirty="0"/>
           </a:p>
         </p:txBody>
       </p:sp>
@@ -3587,7 +3630,6 @@
               <a:rPr lang="zh-CN" altLang="en-US" dirty="0"/>
               <a:t>刘松铭 于子淳</a:t>
             </a:r>
-            <a:endParaRPr lang="zh-CN" altLang="en-US" dirty="0"/>
           </a:p>
         </p:txBody>
       </p:sp>
@@ -3608,6 +3650,7 @@
           <a:p>
             <a:fld id="{519AEA81-C1FD-4B2C-87D1-3FA637539CC6}" type="slidenum">
               <a:rPr lang="zh-CN" altLang="en-US" smtClean="0"/>
+              <a:t>1</a:t>
             </a:fld>
             <a:endParaRPr lang="zh-CN" altLang="en-US" dirty="0"/>
           </a:p>
@@ -3657,7 +3700,6 @@
               <a:rPr lang="zh-CN" altLang="en-US" dirty="0"/>
               <a:t>进度汇报</a:t>
             </a:r>
-            <a:endParaRPr lang="zh-CN" altLang="en-US" dirty="0"/>
           </a:p>
         </p:txBody>
       </p:sp>
@@ -3687,7 +3729,6 @@
               <a:rPr lang="zh-CN" altLang="en-US" dirty="0"/>
               <a:t>于子淳</a:t>
             </a:r>
-            <a:endParaRPr lang="zh-CN" altLang="en-US" dirty="0"/>
           </a:p>
           <a:p>
             <a:r>
@@ -3698,7 +3739,6 @@
               <a:rPr lang="zh-CN" altLang="en-US" dirty="0"/>
               <a:t>分支</a:t>
             </a:r>
-            <a:endParaRPr lang="zh-CN" altLang="en-US" dirty="0"/>
           </a:p>
           <a:p>
             <a:pPr lvl="1"/>
@@ -3708,9 +3748,6 @@
               </a:rPr>
               <a:t>解决之前时间统计为负的情况，主要原因是传入的参数与用户库中不符</a:t>
             </a:r>
-            <a:endParaRPr lang="zh-CN" altLang="en-US" dirty="0">
-              <a:sym typeface="+mn-ea"/>
-            </a:endParaRPr>
           </a:p>
           <a:p>
             <a:pPr lvl="1"/>
@@ -3720,9 +3757,6 @@
               </a:rPr>
               <a:t>对于 coretest（主要通过其测量性能），修复其目前在多核上直接卡死的问题（主要通过将多核调度器实装），目前用时基本和核数成反比</a:t>
             </a:r>
-            <a:endParaRPr lang="zh-CN" altLang="en-US" dirty="0">
-              <a:sym typeface="+mn-ea"/>
-            </a:endParaRPr>
           </a:p>
           <a:p>
             <a:r>
@@ -3743,9 +3777,6 @@
               </a:rPr>
               <a:t>分支</a:t>
             </a:r>
-            <a:endParaRPr lang="zh-CN" altLang="en-US" dirty="0">
-              <a:sym typeface="+mn-ea"/>
-            </a:endParaRPr>
           </a:p>
           <a:p>
             <a:pPr lvl="1"/>
@@ -3755,9 +3786,6 @@
               </a:rPr>
               <a:t>解决编译警告，实装在上面的 zCore 分支上</a:t>
             </a:r>
-            <a:endParaRPr lang="zh-CN" altLang="en-US" dirty="0">
-              <a:sym typeface="+mn-ea"/>
-            </a:endParaRPr>
           </a:p>
           <a:p>
             <a:pPr lvl="1"/>
@@ -3767,9 +3795,6 @@
               </a:rPr>
               <a:t>支持动态输出在哪个核上跑的任务</a:t>
             </a:r>
-            <a:endParaRPr lang="zh-CN" altLang="en-US" dirty="0">
-              <a:sym typeface="+mn-ea"/>
-            </a:endParaRPr>
           </a:p>
           <a:p>
             <a:pPr lvl="1"/>
@@ -3779,9 +3804,6 @@
               </a:rPr>
               <a:t>基于优先级的调度需要讨论一下必要性，严格保序会出现数据结构锁的问题，影响性能，所以目前没有实装</a:t>
             </a:r>
-            <a:endParaRPr lang="zh-CN" altLang="en-US" dirty="0">
-              <a:sym typeface="+mn-ea"/>
-            </a:endParaRPr>
           </a:p>
           <a:p>
             <a:pPr marL="457200" lvl="1" indent="0">
@@ -3811,6 +3833,7 @@
           <a:p>
             <a:fld id="{519AEA81-C1FD-4B2C-87D1-3FA637539CC6}" type="slidenum">
               <a:rPr lang="zh-CN" altLang="en-US" smtClean="0"/>
+              <a:t>2</a:t>
             </a:fld>
             <a:endParaRPr lang="zh-CN" altLang="en-US" dirty="0"/>
           </a:p>
@@ -3860,7 +3883,6 @@
               <a:rPr lang="zh-CN" altLang="en-US" dirty="0"/>
               <a:t>当前问题</a:t>
             </a:r>
-            <a:endParaRPr lang="zh-CN" altLang="en-US" dirty="0"/>
           </a:p>
         </p:txBody>
       </p:sp>
@@ -3903,9 +3925,6 @@
               </a:rPr>
               <a:t>初步调试首先排除调度器标记为无任务状态的问题</a:t>
             </a:r>
-            <a:endParaRPr lang="zh-CN" altLang="en-US" sz="2800" dirty="0">
-              <a:sym typeface="+mn-ea"/>
-            </a:endParaRPr>
           </a:p>
           <a:p>
             <a:pPr lvl="1"/>
@@ -3921,9 +3940,6 @@
               </a:rPr>
               <a:t>对于多核调度器，有一定概率出现借用报错（rust 相关），可能是某些锁的问题</a:t>
             </a:r>
-            <a:endParaRPr lang="zh-CN" altLang="en-US" sz="2800" dirty="0">
-              <a:sym typeface="+mn-ea"/>
-            </a:endParaRPr>
           </a:p>
           <a:p>
             <a:pPr lvl="1"/>
@@ -3960,6 +3976,7 @@
           <a:p>
             <a:fld id="{519AEA81-C1FD-4B2C-87D1-3FA637539CC6}" type="slidenum">
               <a:rPr lang="zh-CN" altLang="en-US" smtClean="0"/>
+              <a:t>3</a:t>
             </a:fld>
             <a:endParaRPr lang="zh-CN" altLang="en-US" dirty="0"/>
           </a:p>
@@ -3974,7 +3991,7 @@
           <p:nvPr/>
         </p:nvPicPr>
         <p:blipFill>
-          <a:blip r:embed="rId1"/>
+          <a:blip r:embed="rId2"/>
           <a:stretch>
             <a:fillRect/>
           </a:stretch>
@@ -4016,7 +4033,13 @@
       </p:grpSpPr>
       <p:sp>
         <p:nvSpPr>
-          <p:cNvPr id="2" name="标题 1"/>
+          <p:cNvPr id="2" name="标题 1">
+            <a:extLst>
+              <a:ext uri="{FF2B5EF4-FFF2-40B4-BE49-F238E27FC236}">
+                <a16:creationId xmlns:a16="http://schemas.microsoft.com/office/drawing/2014/main" id="{6DF13375-A72F-861E-BF2F-5F4DFAF80F46}"/>
+              </a:ext>
+            </a:extLst>
+          </p:cNvPr>
           <p:cNvSpPr>
             <a:spLocks noGrp="1"/>
           </p:cNvSpPr>
@@ -4030,16 +4053,21 @@
           <a:lstStyle/>
           <a:p>
             <a:r>
-              <a:rPr lang="zh-CN" altLang="en-US"/>
+              <a:rPr lang="zh-CN" altLang="en-US" dirty="0"/>
               <a:t>进度汇报</a:t>
             </a:r>
-            <a:endParaRPr lang="zh-CN" altLang="en-US"/>
-          </a:p>
-        </p:txBody>
-      </p:sp>
-      <p:sp>
-        <p:nvSpPr>
-          <p:cNvPr id="3" name="内容占位符 2"/>
+          </a:p>
+        </p:txBody>
+      </p:sp>
+      <p:sp>
+        <p:nvSpPr>
+          <p:cNvPr id="3" name="内容占位符 2">
+            <a:extLst>
+              <a:ext uri="{FF2B5EF4-FFF2-40B4-BE49-F238E27FC236}">
+                <a16:creationId xmlns:a16="http://schemas.microsoft.com/office/drawing/2014/main" id="{3832D4E5-4163-5A6E-7EE4-819BCFF88254}"/>
+              </a:ext>
+            </a:extLst>
+          </p:cNvPr>
           <p:cNvSpPr>
             <a:spLocks noGrp="1"/>
           </p:cNvSpPr>
@@ -4047,12 +4075,7 @@
             <p:ph idx="1"/>
           </p:nvPr>
         </p:nvSpPr>
-        <p:spPr>
-          <a:xfrm>
-            <a:off x="838200" y="1825625"/>
-            <a:ext cx="10717530" cy="4667250"/>
-          </a:xfrm>
-        </p:spPr>
+        <p:spPr/>
         <p:txBody>
           <a:bodyPr/>
           <a:lstStyle/>
@@ -4061,24 +4084,175 @@
               <a:rPr lang="zh-CN" altLang="en-US" dirty="0"/>
               <a:t>刘松铭</a:t>
             </a:r>
-            <a:endParaRPr lang="zh-CN" altLang="en-US" dirty="0"/>
+            <a:endParaRPr lang="en-US" altLang="zh-CN" dirty="0"/>
+          </a:p>
+          <a:p>
+            <a:r>
+              <a:rPr lang="en-US" altLang="zh-CN" dirty="0"/>
+              <a:t>SD</a:t>
+            </a:r>
+            <a:r>
+              <a:rPr lang="zh-CN" altLang="en-US" dirty="0"/>
+              <a:t>卡</a:t>
+            </a:r>
+            <a:endParaRPr lang="en-US" altLang="zh-CN" dirty="0"/>
           </a:p>
           <a:p>
             <a:pPr lvl="1"/>
+            <a:r>
+              <a:rPr lang="zh-CN" altLang="en-US" dirty="0"/>
+              <a:t>完成</a:t>
+            </a:r>
+            <a:r>
+              <a:rPr lang="en-US" altLang="zh-CN" dirty="0"/>
+              <a:t>SD</a:t>
+            </a:r>
+            <a:r>
+              <a:rPr lang="zh-CN" altLang="en-US" dirty="0"/>
+              <a:t>卡的制作，有文档记录</a:t>
+            </a:r>
             <a:endParaRPr lang="en-US" altLang="zh-CN" dirty="0"/>
           </a:p>
           <a:p>
+            <a:pPr lvl="1"/>
+            <a:r>
+              <a:rPr lang="zh-CN" altLang="en-US" dirty="0"/>
+              <a:t>用的不是原厂镜像（报错</a:t>
+            </a:r>
+            <a:r>
+              <a:rPr lang="en-US" altLang="zh-CN" dirty="0"/>
+              <a:t>build</a:t>
+            </a:r>
+            <a:r>
+              <a:rPr lang="zh-CN" altLang="en-US" dirty="0"/>
+              <a:t>失败），而是</a:t>
+            </a:r>
+            <a:r>
+              <a:rPr lang="en-US" altLang="zh-CN" dirty="0"/>
+              <a:t>Ubuntu</a:t>
+            </a:r>
+            <a:r>
+              <a:rPr lang="zh-CN" altLang="en-US" dirty="0"/>
+              <a:t>官方的</a:t>
+            </a:r>
+            <a:r>
+              <a:rPr lang="en-US" altLang="zh-CN" dirty="0"/>
+              <a:t>U740</a:t>
+            </a:r>
+            <a:r>
+              <a:rPr lang="zh-CN" altLang="en-US" dirty="0"/>
+              <a:t>镜像</a:t>
+            </a:r>
             <a:endParaRPr lang="en-US" altLang="zh-CN" dirty="0"/>
           </a:p>
           <a:p>
             <a:pPr lvl="1"/>
+            <a:r>
+              <a:rPr lang="en-US" altLang="zh-CN" dirty="0"/>
+              <a:t>SD</a:t>
+            </a:r>
+            <a:r>
+              <a:rPr lang="zh-CN" altLang="en-US" dirty="0"/>
+              <a:t>卡内的</a:t>
+            </a:r>
+            <a:r>
+              <a:rPr lang="en-US" altLang="zh-CN" dirty="0" err="1"/>
+              <a:t>Uboot</a:t>
+            </a:r>
+            <a:r>
+              <a:rPr lang="zh-CN" altLang="en-US" dirty="0"/>
+              <a:t>可以正常使用</a:t>
+            </a:r>
             <a:endParaRPr lang="en-US" altLang="zh-CN" dirty="0"/>
           </a:p>
-        </p:txBody>
-      </p:sp>
-      <p:sp>
-        <p:nvSpPr>
-          <p:cNvPr id="4" name="灯片编号占位符 3"/>
+          <a:p>
+            <a:r>
+              <a:rPr lang="zh-CN" altLang="en-US" dirty="0"/>
+              <a:t>网络起</a:t>
+            </a:r>
+            <a:r>
+              <a:rPr lang="en-US" altLang="zh-CN" dirty="0" err="1"/>
+              <a:t>zCore</a:t>
+            </a:r>
+            <a:endParaRPr lang="en-US" altLang="zh-CN" dirty="0"/>
+          </a:p>
+          <a:p>
+            <a:pPr lvl="1"/>
+            <a:r>
+              <a:rPr lang="en-US" altLang="zh-CN" dirty="0"/>
+              <a:t>SD</a:t>
+            </a:r>
+            <a:r>
+              <a:rPr lang="zh-CN" altLang="en-US" dirty="0"/>
+              <a:t>卡拷贝镜像 </a:t>
+            </a:r>
+            <a:r>
+              <a:rPr lang="en-US" altLang="zh-CN" dirty="0"/>
+              <a:t>-&gt; </a:t>
+            </a:r>
+            <a:r>
+              <a:rPr lang="zh-CN" altLang="en-US" dirty="0"/>
+              <a:t>通过网络加载镜像并</a:t>
+            </a:r>
+            <a:r>
+              <a:rPr lang="en-US" altLang="zh-CN" dirty="0"/>
+              <a:t>boot</a:t>
+            </a:r>
+          </a:p>
+          <a:p>
+            <a:pPr lvl="1"/>
+            <a:r>
+              <a:rPr lang="zh-CN" altLang="en-US" dirty="0"/>
+              <a:t>有关过程及注意事项记录在文档</a:t>
+            </a:r>
+            <a:endParaRPr lang="en-US" altLang="zh-CN" dirty="0"/>
+          </a:p>
+          <a:p>
+            <a:pPr lvl="1"/>
+            <a:r>
+              <a:rPr lang="zh-CN" altLang="en-US" dirty="0"/>
+              <a:t>将原本的</a:t>
+            </a:r>
+            <a:r>
+              <a:rPr lang="en-US" altLang="zh-CN" dirty="0" err="1"/>
+              <a:t>uImage</a:t>
+            </a:r>
+            <a:r>
+              <a:rPr lang="zh-CN" altLang="en-US" dirty="0"/>
+              <a:t>换成了</a:t>
+            </a:r>
+            <a:r>
+              <a:rPr lang="en-US" altLang="zh-CN" dirty="0"/>
+              <a:t>FIT-</a:t>
+            </a:r>
+            <a:r>
+              <a:rPr lang="en-US" altLang="zh-CN" dirty="0" err="1"/>
+              <a:t>uImage</a:t>
+            </a:r>
+            <a:r>
+              <a:rPr lang="zh-CN" altLang="en-US" dirty="0"/>
+              <a:t>，集成设备树，从而不再依赖</a:t>
+            </a:r>
+            <a:r>
+              <a:rPr lang="en-US" altLang="zh-CN" dirty="0" err="1"/>
+              <a:t>Uboot</a:t>
+            </a:r>
+            <a:r>
+              <a:rPr lang="zh-CN" altLang="en-US" dirty="0"/>
+              <a:t>的版本</a:t>
+            </a:r>
+          </a:p>
+        </p:txBody>
+      </p:sp>
+      <p:sp>
+        <p:nvSpPr>
+          <p:cNvPr id="4" name="灯片编号占位符 3">
+            <a:extLst>
+              <a:ext uri="{FF2B5EF4-FFF2-40B4-BE49-F238E27FC236}">
+                <a16:creationId xmlns:a16="http://schemas.microsoft.com/office/drawing/2014/main" id="{B9D997D9-EB13-9B16-6DD2-C9738A8D87D2}"/>
+              </a:ext>
+            </a:extLst>
+          </p:cNvPr>
           <p:cNvSpPr>
             <a:spLocks noGrp="1"/>
           </p:cNvSpPr>
@@ -4093,12 +4267,18 @@
           <a:p>
             <a:fld id="{519AEA81-C1FD-4B2C-87D1-3FA637539CC6}" type="slidenum">
               <a:rPr lang="zh-CN" altLang="en-US" smtClean="0"/>
+              <a:t>4</a:t>
             </a:fld>
             <a:endParaRPr lang="zh-CN" altLang="en-US" dirty="0"/>
           </a:p>
         </p:txBody>
       </p:sp>
     </p:spTree>
+    <p:extLst>
+      <p:ext uri="{BB962C8B-B14F-4D97-AF65-F5344CB8AC3E}">
+        <p14:creationId xmlns:p14="http://schemas.microsoft.com/office/powerpoint/2010/main" val="1098683772"/>
+      </p:ext>
+    </p:extLst>
   </p:cSld>
   <p:clrMapOvr>
     <a:masterClrMapping/>
@@ -4125,6 +4305,187 @@
       </p:grpSpPr>
       <p:sp>
         <p:nvSpPr>
+          <p:cNvPr id="2" name="标题 1"/>
+          <p:cNvSpPr>
+            <a:spLocks noGrp="1"/>
+          </p:cNvSpPr>
+          <p:nvPr>
+            <p:ph type="title"/>
+          </p:nvPr>
+        </p:nvSpPr>
+        <p:spPr/>
+        <p:txBody>
+          <a:bodyPr/>
+          <a:lstStyle/>
+          <a:p>
+            <a:r>
+              <a:rPr lang="zh-CN" altLang="en-US"/>
+              <a:t>进度汇报</a:t>
+            </a:r>
+          </a:p>
+        </p:txBody>
+      </p:sp>
+      <p:sp>
+        <p:nvSpPr>
+          <p:cNvPr id="3" name="内容占位符 2"/>
+          <p:cNvSpPr>
+            <a:spLocks noGrp="1"/>
+          </p:cNvSpPr>
+          <p:nvPr>
+            <p:ph idx="1"/>
+          </p:nvPr>
+        </p:nvSpPr>
+        <p:spPr>
+          <a:xfrm>
+            <a:off x="838200" y="1825625"/>
+            <a:ext cx="10717530" cy="4667250"/>
+          </a:xfrm>
+        </p:spPr>
+        <p:txBody>
+          <a:bodyPr/>
+          <a:lstStyle/>
+          <a:p>
+            <a:r>
+              <a:rPr lang="zh-CN" altLang="en-US" dirty="0"/>
+              <a:t>当前问题</a:t>
+            </a:r>
+            <a:endParaRPr lang="en-US" altLang="zh-CN" dirty="0"/>
+          </a:p>
+          <a:p>
+            <a:pPr lvl="1"/>
+            <a:r>
+              <a:rPr lang="zh-CN" altLang="en-US" dirty="0"/>
+              <a:t>已经可以进入到内核启动阶段</a:t>
+            </a:r>
+            <a:endParaRPr lang="en-US" altLang="zh-CN" dirty="0"/>
+          </a:p>
+          <a:p>
+            <a:pPr lvl="1"/>
+            <a:r>
+              <a:rPr lang="zh-CN" altLang="en-US" dirty="0"/>
+              <a:t>但是内核还存在</a:t>
+            </a:r>
+            <a:r>
+              <a:rPr lang="en-US" altLang="zh-CN" dirty="0"/>
+              <a:t>bug</a:t>
+            </a:r>
+            <a:r>
+              <a:rPr lang="zh-CN" altLang="en-US" dirty="0"/>
+              <a:t>，上次的小核</a:t>
+            </a:r>
+            <a:r>
+              <a:rPr lang="en-US" altLang="zh-CN" dirty="0"/>
+              <a:t>bug</a:t>
+            </a:r>
+            <a:r>
+              <a:rPr lang="zh-CN" altLang="en-US" dirty="0"/>
+              <a:t>已经解决，出现新</a:t>
+            </a:r>
+            <a:r>
+              <a:rPr lang="en-US" altLang="zh-CN" dirty="0"/>
+              <a:t>bug</a:t>
+            </a:r>
+            <a:endParaRPr lang="zh-CN" altLang="en-US" dirty="0"/>
+          </a:p>
+          <a:p>
+            <a:pPr lvl="1"/>
+            <a:endParaRPr lang="en-US" altLang="zh-CN" dirty="0"/>
+          </a:p>
+          <a:p>
+            <a:endParaRPr lang="en-US" altLang="zh-CN" dirty="0"/>
+          </a:p>
+          <a:p>
+            <a:pPr lvl="1"/>
+            <a:endParaRPr lang="en-US" altLang="zh-CN" dirty="0"/>
+          </a:p>
+        </p:txBody>
+      </p:sp>
+      <p:sp>
+        <p:nvSpPr>
+          <p:cNvPr id="4" name="灯片编号占位符 3"/>
+          <p:cNvSpPr>
+            <a:spLocks noGrp="1"/>
+          </p:cNvSpPr>
+          <p:nvPr>
+            <p:ph type="sldNum" sz="quarter" idx="12"/>
+          </p:nvPr>
+        </p:nvSpPr>
+        <p:spPr/>
+        <p:txBody>
+          <a:bodyPr/>
+          <a:lstStyle/>
+          <a:p>
+            <a:fld id="{519AEA81-C1FD-4B2C-87D1-3FA637539CC6}" type="slidenum">
+              <a:rPr lang="zh-CN" altLang="en-US" smtClean="0"/>
+              <a:t>5</a:t>
+            </a:fld>
+            <a:endParaRPr lang="zh-CN" altLang="en-US" dirty="0"/>
+          </a:p>
+        </p:txBody>
+      </p:sp>
+      <p:pic>
+        <p:nvPicPr>
+          <p:cNvPr id="6" name="图片 5">
+            <a:extLst>
+              <a:ext uri="{FF2B5EF4-FFF2-40B4-BE49-F238E27FC236}">
+                <a16:creationId xmlns:a16="http://schemas.microsoft.com/office/drawing/2014/main" id="{622E07BE-E569-8E65-82BC-FD367D4927D8}"/>
+              </a:ext>
+            </a:extLst>
+          </p:cNvPr>
+          <p:cNvPicPr>
+            <a:picLocks noChangeAspect="1"/>
+          </p:cNvPicPr>
+          <p:nvPr/>
+        </p:nvPicPr>
+        <p:blipFill>
+          <a:blip r:embed="rId2">
+            <a:extLst>
+              <a:ext uri="{28A0092B-C50C-407E-A947-70E740481C1C}">
+                <a14:useLocalDpi xmlns:a14="http://schemas.microsoft.com/office/drawing/2010/main" val="0"/>
+              </a:ext>
+            </a:extLst>
+          </a:blip>
+          <a:stretch>
+            <a:fillRect/>
+          </a:stretch>
+        </p:blipFill>
+        <p:spPr>
+          <a:xfrm>
+            <a:off x="1379800" y="3171925"/>
+            <a:ext cx="5984386" cy="3435250"/>
+          </a:xfrm>
+          <a:prstGeom prst="rect">
+            <a:avLst/>
+          </a:prstGeom>
+        </p:spPr>
+      </p:pic>
+    </p:spTree>
+  </p:cSld>
+  <p:clrMapOvr>
+    <a:masterClrMapping/>
+  </p:clrMapOvr>
+</p:sld>
+</file>
+
+<file path=ppt/slides/slide6.xml><?xml version="1.0" encoding="utf-8"?>
+<p:sld xmlns:a="http://schemas.openxmlformats.org/drawingml/2006/main" xmlns:r="http://schemas.openxmlformats.org/officeDocument/2006/relationships" xmlns:p="http://schemas.openxmlformats.org/presentationml/2006/main">
+  <p:cSld>
+    <p:spTree>
+      <p:nvGrpSpPr>
+        <p:cNvPr id="1" name=""/>
+        <p:cNvGrpSpPr/>
+        <p:nvPr/>
+      </p:nvGrpSpPr>
+      <p:grpSpPr>
+        <a:xfrm>
+          <a:off x="0" y="0"/>
+          <a:ext cx="0" cy="0"/>
+          <a:chOff x="0" y="0"/>
+          <a:chExt cx="0" cy="0"/>
+        </a:xfrm>
+      </p:grpSpPr>
+      <p:sp>
+        <p:nvSpPr>
           <p:cNvPr id="7" name="标题 6"/>
           <p:cNvSpPr>
             <a:spLocks noGrp="1"/>
@@ -4165,7 +4526,6 @@
               <a:rPr lang="zh-CN" altLang="en-US"/>
               <a:t>感谢张译仁助教的鼎力支持！</a:t>
             </a:r>
-            <a:endParaRPr lang="zh-CN" altLang="en-US"/>
           </a:p>
         </p:txBody>
       </p:sp>
@@ -4186,6 +4546,7 @@
           <a:p>
             <a:fld id="{519AEA81-C1FD-4B2C-87D1-3FA637539CC6}" type="slidenum">
               <a:rPr lang="zh-CN" altLang="en-US" smtClean="0"/>
+              <a:t>6</a:t>
             </a:fld>
             <a:endParaRPr lang="zh-CN" altLang="en-US" dirty="0"/>
           </a:p>
@@ -4523,6 +4884,7 @@
       </a:lstStyle>
     </a:txDef>
   </a:objectDefaults>
+  <a:extraClrSchemeLst/>
   <a:extLst>
     <a:ext uri="{05A4C25C-085E-4340-85A3-A5531E510DB2}">
       <thm15:themeFamily xmlns:thm15="http://schemas.microsoft.com/office/thememl/2012/main" name="Office Theme" id="{62F939B6-93AF-4DB8-9C6B-D6C7DFDC589F}" vid="{4A3C46E8-61CC-4603-A589-7422A47A8E4A}"/>
@@ -4782,6 +5144,8 @@
       </a:bgFillStyleLst>
     </a:fmtScheme>
   </a:themeElements>
+  <a:objectDefaults/>
+  <a:extraClrSchemeLst/>
   <a:extLst>
     <a:ext uri="{05A4C25C-085E-4340-85A3-A5531E510DB2}">
       <thm15:themeFamily xmlns:thm15="http://schemas.microsoft.com/office/thememl/2012/main" name="Office Theme" id="{62F939B6-93AF-4DB8-9C6B-D6C7DFDC589F}" vid="{4A3C46E8-61CC-4603-A589-7422A47A8E4A}"/>
@@ -5041,6 +5405,8 @@
       </a:bgFillStyleLst>
     </a:fmtScheme>
   </a:themeElements>
+  <a:objectDefaults/>
+  <a:extraClrSchemeLst/>
   <a:extLst>
     <a:ext uri="{05A4C25C-085E-4340-85A3-A5531E510DB2}">
       <thm15:themeFamily xmlns:thm15="http://schemas.microsoft.com/office/thememl/2012/main" name="Office Theme" id="{62F939B6-93AF-4DB8-9C6B-D6C7DFDC589F}" vid="{4A3C46E8-61CC-4603-A589-7422A47A8E4A}"/>

</xml_diff>